<commit_message>
updated agenda to match the titles
</commit_message>
<xml_diff>
--- a/Presentation/CS598 DL4H Project Presentation.pptx
+++ b/Presentation/CS598 DL4H Project Presentation.pptx
@@ -323,6 +323,11 @@
       </a:defRPr>
     </a:lvl9pPr>
   </p:defaultTextStyle>
+  <p:extLst>
+    <p:ext uri="{EFAFB233-063F-42B5-8137-9DF3F51BA10A}">
+      <p15:sldGuideLst xmlns:p15="http://schemas.microsoft.com/office/powerpoint/2012/main"/>
+    </p:ext>
+  </p:extLst>
 </p:presentation>
 </file>
 
@@ -2239,7 +2244,7 @@
           </a:ln>
           <a:extLst>
             <a:ext uri="{C572A759-6A51-4108-AA02-DFA0A04FC94B}">
-              <ma14:wrappingTextBoxFlag xmlns:ma14="http://schemas.microsoft.com/office/mac/drawingml/2011/main" xmlns:a14="http://schemas.microsoft.com/office/drawing/2010/main" xmlns:m="http://schemas.openxmlformats.org/officeDocument/2006/math" xmlns="" val="1"/>
+              <ma14:wrappingTextBoxFlag xmlns="" xmlns:m="http://schemas.openxmlformats.org/officeDocument/2006/math" xmlns:a14="http://schemas.microsoft.com/office/drawing/2010/main" xmlns:ma14="http://schemas.microsoft.com/office/mac/drawingml/2011/main" val="1"/>
             </a:ext>
           </a:extLst>
         </p:spPr>
@@ -2278,7 +2283,7 @@
           </a:ln>
           <a:extLst>
             <a:ext uri="{C572A759-6A51-4108-AA02-DFA0A04FC94B}">
-              <ma14:wrappingTextBoxFlag xmlns:ma14="http://schemas.microsoft.com/office/mac/drawingml/2011/main" xmlns:a14="http://schemas.microsoft.com/office/drawing/2010/main" xmlns:m="http://schemas.openxmlformats.org/officeDocument/2006/math" xmlns="" val="1"/>
+              <ma14:wrappingTextBoxFlag xmlns="" xmlns:m="http://schemas.openxmlformats.org/officeDocument/2006/math" xmlns:a14="http://schemas.microsoft.com/office/drawing/2010/main" xmlns:ma14="http://schemas.microsoft.com/office/mac/drawingml/2011/main" val="1"/>
             </a:ext>
           </a:extLst>
         </p:spPr>
@@ -3223,7 +3228,7 @@
           </a:ln>
           <a:extLst>
             <a:ext uri="{C572A759-6A51-4108-AA02-DFA0A04FC94B}">
-              <ma14:wrappingTextBoxFlag xmlns:ma14="http://schemas.microsoft.com/office/mac/drawingml/2011/main" xmlns:a14="http://schemas.microsoft.com/office/drawing/2010/main" xmlns:m="http://schemas.openxmlformats.org/officeDocument/2006/math" xmlns="" val="1"/>
+              <ma14:wrappingTextBoxFlag xmlns="" xmlns:m="http://schemas.openxmlformats.org/officeDocument/2006/math" xmlns:a14="http://schemas.microsoft.com/office/drawing/2010/main" xmlns:ma14="http://schemas.microsoft.com/office/mac/drawingml/2011/main" val="1"/>
             </a:ext>
           </a:extLst>
         </p:spPr>
@@ -4084,7 +4089,9 @@
           </a:prstGeom>
         </p:spPr>
         <p:txBody>
-          <a:bodyPr/>
+          <a:bodyPr>
+            <a:normAutofit lnSpcReduction="10000"/>
+          </a:bodyPr>
           <a:lstStyle/>
           <a:p>
             <a:pPr>
@@ -4171,9 +4178,18 @@
             </a:pPr>
             <a:r>
               <a:rPr lang="en-US" dirty="0"/>
-              <a:t>Ablation / Code Modification</a:t>
-            </a:r>
-            <a:endParaRPr dirty="0"/>
+              <a:t>Ablation / Code Modification – 1</a:t>
+            </a:r>
+          </a:p>
+          <a:p>
+            <a:pPr>
+              <a:buFontTx/>
+              <a:buAutoNum type="arabicPeriod"/>
+            </a:pPr>
+            <a:r>
+              <a:rPr lang="en-US" dirty="0"/>
+              <a:t>Ablation / Code Modification – 2 and 3</a:t>
+            </a:r>
           </a:p>
           <a:p>
             <a:pPr>
@@ -5661,7 +5677,7 @@
             <a:effectLst/>
             <a:extLst>
               <a:ext uri="{C572A759-6A51-4108-AA02-DFA0A04FC94B}">
-                <ma14:wrappingTextBoxFlag xmlns:ma14="http://schemas.microsoft.com/office/mac/drawingml/2011/main" xmlns:a14="http://schemas.microsoft.com/office/drawing/2010/main" xmlns:m="http://schemas.openxmlformats.org/officeDocument/2006/math" xmlns="" val="1"/>
+                <ma14:wrappingTextBoxFlag xmlns="" xmlns:m="http://schemas.openxmlformats.org/officeDocument/2006/math" xmlns:a14="http://schemas.microsoft.com/office/drawing/2010/main" xmlns:ma14="http://schemas.microsoft.com/office/mac/drawingml/2011/main" val="1"/>
               </a:ext>
             </a:extLst>
           </p:spPr>

</xml_diff>